<commit_message>
Video + ppt  update
</commit_message>
<xml_diff>
--- a/Documenten/Mobiele app.pptx
+++ b/Documenten/Mobiele app.pptx
@@ -5,15 +5,17 @@
     <p:sldMasterId id="2147483700" r:id="rId1"/>
   </p:sldMasterIdLst>
   <p:notesMasterIdLst>
-    <p:notesMasterId r:id="rId8"/>
+    <p:notesMasterId r:id="rId10"/>
   </p:notesMasterIdLst>
   <p:sldIdLst>
     <p:sldId id="256" r:id="rId2"/>
     <p:sldId id="257" r:id="rId3"/>
     <p:sldId id="258" r:id="rId4"/>
-    <p:sldId id="259" r:id="rId5"/>
-    <p:sldId id="260" r:id="rId6"/>
-    <p:sldId id="261" r:id="rId7"/>
+    <p:sldId id="262" r:id="rId5"/>
+    <p:sldId id="263" r:id="rId6"/>
+    <p:sldId id="259" r:id="rId7"/>
+    <p:sldId id="260" r:id="rId8"/>
+    <p:sldId id="261" r:id="rId9"/>
   </p:sldIdLst>
   <p:sldSz cx="12192000" cy="6858000"/>
   <p:notesSz cx="6858000" cy="9144000"/>
@@ -820,7 +822,7 @@
           <a:p>
             <a:fld id="{920820BD-FF48-48FB-B400-48C5434C3C80}" type="slidenum">
               <a:rPr lang="nl-BE" smtClean="0"/>
-              <a:t>5</a:t>
+              <a:t>7</a:t>
             </a:fld>
             <a:endParaRPr lang="nl-BE"/>
           </a:p>
@@ -907,7 +909,7 @@
           <a:p>
             <a:fld id="{920820BD-FF48-48FB-B400-48C5434C3C80}" type="slidenum">
               <a:rPr lang="nl-BE" smtClean="0"/>
-              <a:t>6</a:t>
+              <a:t>8</a:t>
             </a:fld>
             <a:endParaRPr lang="nl-BE"/>
           </a:p>
@@ -5439,15 +5441,53 @@
             <p:ph idx="1"/>
           </p:nvPr>
         </p:nvSpPr>
-        <p:spPr/>
+        <p:spPr>
+          <a:xfrm>
+            <a:off x="1876778" y="1825625"/>
+            <a:ext cx="3032574" cy="651246"/>
+          </a:xfrm>
+        </p:spPr>
         <p:txBody>
           <a:bodyPr/>
           <a:lstStyle/>
           <a:p>
-            <a:endParaRPr lang="nl-BE" dirty="0"/>
-          </a:p>
-        </p:txBody>
-      </p:sp>
+            <a:r>
+              <a:rPr lang="nl-BE" dirty="0"/>
+              <a:t>Hoofd scherm</a:t>
+            </a:r>
+          </a:p>
+        </p:txBody>
+      </p:sp>
+      <p:pic>
+        <p:nvPicPr>
+          <p:cNvPr id="3" name="Afbeelding 2"/>
+          <p:cNvPicPr>
+            <a:picLocks noChangeAspect="1"/>
+          </p:cNvPicPr>
+          <p:nvPr/>
+        </p:nvPicPr>
+        <p:blipFill>
+          <a:blip r:embed="rId3">
+            <a:extLst>
+              <a:ext uri="{28A0092B-C50C-407E-A947-70E740481C1C}">
+                <a14:useLocalDpi xmlns:a14="http://schemas.microsoft.com/office/drawing/2010/main" val="0"/>
+              </a:ext>
+            </a:extLst>
+          </a:blip>
+          <a:stretch>
+            <a:fillRect/>
+          </a:stretch>
+        </p:blipFill>
+        <p:spPr>
+          <a:xfrm>
+            <a:off x="6288394" y="365125"/>
+            <a:ext cx="3414898" cy="6070929"/>
+          </a:xfrm>
+          <a:prstGeom prst="rect">
+            <a:avLst/>
+          </a:prstGeom>
+        </p:spPr>
+      </p:pic>
     </p:spTree>
     <p:extLst>
       <p:ext uri="{BB962C8B-B14F-4D97-AF65-F5344CB8AC3E}">
@@ -5507,8 +5547,9 @@
           <a:p>
             <a:r>
               <a:rPr lang="nl-BE" dirty="0"/>
-              <a:t>Opbouw</a:t>
-            </a:r>
+              <a:t>Werking</a:t>
+            </a:r>
+            <a:endParaRPr lang="nl-NL" dirty="0"/>
           </a:p>
         </p:txBody>
       </p:sp>
@@ -5522,19 +5563,57 @@
             <p:ph idx="1"/>
           </p:nvPr>
         </p:nvSpPr>
-        <p:spPr/>
+        <p:spPr>
+          <a:xfrm>
+            <a:off x="1876777" y="1825624"/>
+            <a:ext cx="2704101" cy="509203"/>
+          </a:xfrm>
+        </p:spPr>
         <p:txBody>
           <a:bodyPr/>
           <a:lstStyle/>
           <a:p>
-            <a:endParaRPr lang="nl-BE"/>
-          </a:p>
-        </p:txBody>
-      </p:sp>
+            <a:r>
+              <a:rPr lang="nl-NL" dirty="0"/>
+              <a:t>Over scherm</a:t>
+            </a:r>
+          </a:p>
+        </p:txBody>
+      </p:sp>
+      <p:pic>
+        <p:nvPicPr>
+          <p:cNvPr id="5" name="Afbeelding 4"/>
+          <p:cNvPicPr>
+            <a:picLocks noChangeAspect="1"/>
+          </p:cNvPicPr>
+          <p:nvPr/>
+        </p:nvPicPr>
+        <p:blipFill>
+          <a:blip r:embed="rId2">
+            <a:extLst>
+              <a:ext uri="{28A0092B-C50C-407E-A947-70E740481C1C}">
+                <a14:useLocalDpi xmlns:a14="http://schemas.microsoft.com/office/drawing/2010/main" val="0"/>
+              </a:ext>
+            </a:extLst>
+          </a:blip>
+          <a:stretch>
+            <a:fillRect/>
+          </a:stretch>
+        </p:blipFill>
+        <p:spPr>
+          <a:xfrm>
+            <a:off x="6288400" y="365125"/>
+            <a:ext cx="3414150" cy="6069600"/>
+          </a:xfrm>
+          <a:prstGeom prst="rect">
+            <a:avLst/>
+          </a:prstGeom>
+        </p:spPr>
+      </p:pic>
     </p:spTree>
     <p:extLst>
       <p:ext uri="{BB962C8B-B14F-4D97-AF65-F5344CB8AC3E}">
-        <p14:creationId xmlns:p14="http://schemas.microsoft.com/office/powerpoint/2010/main" val="3978210688"/>
+        <p14:creationId xmlns:p14="http://schemas.microsoft.com/office/powerpoint/2010/main" val="1870604398"/>
       </p:ext>
     </p:extLst>
   </p:cSld>
@@ -5583,6 +5662,211 @@
             <p:ph type="title"/>
           </p:nvPr>
         </p:nvSpPr>
+        <p:spPr/>
+        <p:txBody>
+          <a:bodyPr/>
+          <a:lstStyle/>
+          <a:p>
+            <a:r>
+              <a:rPr lang="nl-BE" dirty="0"/>
+              <a:t>Werking</a:t>
+            </a:r>
+            <a:endParaRPr lang="nl-NL" dirty="0"/>
+          </a:p>
+        </p:txBody>
+      </p:sp>
+      <p:sp>
+        <p:nvSpPr>
+          <p:cNvPr id="3" name="Tijdelijke aanduiding voor inhoud 2"/>
+          <p:cNvSpPr>
+            <a:spLocks noGrp="1"/>
+          </p:cNvSpPr>
+          <p:nvPr>
+            <p:ph idx="1"/>
+          </p:nvPr>
+        </p:nvSpPr>
+        <p:spPr>
+          <a:xfrm>
+            <a:off x="1876777" y="1825624"/>
+            <a:ext cx="2704101" cy="509203"/>
+          </a:xfrm>
+        </p:spPr>
+        <p:txBody>
+          <a:bodyPr/>
+          <a:lstStyle/>
+          <a:p>
+            <a:r>
+              <a:rPr lang="nl-NL" dirty="0"/>
+              <a:t>Route scherm</a:t>
+            </a:r>
+          </a:p>
+        </p:txBody>
+      </p:sp>
+      <p:pic>
+        <p:nvPicPr>
+          <p:cNvPr id="6" name="Afbeelding 5"/>
+          <p:cNvPicPr>
+            <a:picLocks noChangeAspect="1"/>
+          </p:cNvPicPr>
+          <p:nvPr/>
+        </p:nvPicPr>
+        <p:blipFill>
+          <a:blip r:embed="rId2">
+            <a:extLst>
+              <a:ext uri="{28A0092B-C50C-407E-A947-70E740481C1C}">
+                <a14:useLocalDpi xmlns:a14="http://schemas.microsoft.com/office/drawing/2010/main" val="0"/>
+              </a:ext>
+            </a:extLst>
+          </a:blip>
+          <a:stretch>
+            <a:fillRect/>
+          </a:stretch>
+        </p:blipFill>
+        <p:spPr>
+          <a:xfrm>
+            <a:off x="6288400" y="365125"/>
+            <a:ext cx="3414150" cy="6069600"/>
+          </a:xfrm>
+          <a:prstGeom prst="rect">
+            <a:avLst/>
+          </a:prstGeom>
+        </p:spPr>
+      </p:pic>
+    </p:spTree>
+    <p:extLst>
+      <p:ext uri="{BB962C8B-B14F-4D97-AF65-F5344CB8AC3E}">
+        <p14:creationId xmlns:p14="http://schemas.microsoft.com/office/powerpoint/2010/main" val="3654331092"/>
+      </p:ext>
+    </p:extLst>
+  </p:cSld>
+  <p:clrMapOvr>
+    <a:masterClrMapping/>
+  </p:clrMapOvr>
+  <mc:AlternateContent xmlns:mc="http://schemas.openxmlformats.org/markup-compatibility/2006">
+    <mc:Choice xmlns:p159="http://schemas.microsoft.com/office/powerpoint/2015/09/main" Requires="p159">
+      <p:transition xmlns:p14="http://schemas.microsoft.com/office/powerpoint/2010/main" spd="slow" p14:dur="2000">
+        <p159:morph option="byObject"/>
+      </p:transition>
+    </mc:Choice>
+    <mc:Fallback>
+      <p:transition spd="slow">
+        <p:fade/>
+      </p:transition>
+    </mc:Fallback>
+  </mc:AlternateContent>
+</p:sld>
+</file>
+
+<file path=ppt/slides/slide6.xml><?xml version="1.0" encoding="utf-8"?>
+<p:sld xmlns:a="http://schemas.openxmlformats.org/drawingml/2006/main" xmlns:r="http://schemas.openxmlformats.org/officeDocument/2006/relationships" xmlns:p="http://schemas.openxmlformats.org/presentationml/2006/main">
+  <p:cSld>
+    <p:spTree>
+      <p:nvGrpSpPr>
+        <p:cNvPr id="1" name=""/>
+        <p:cNvGrpSpPr/>
+        <p:nvPr/>
+      </p:nvGrpSpPr>
+      <p:grpSpPr>
+        <a:xfrm>
+          <a:off x="0" y="0"/>
+          <a:ext cx="0" cy="0"/>
+          <a:chOff x="0" y="0"/>
+          <a:chExt cx="0" cy="0"/>
+        </a:xfrm>
+      </p:grpSpPr>
+      <p:sp>
+        <p:nvSpPr>
+          <p:cNvPr id="2" name="Titel 1"/>
+          <p:cNvSpPr>
+            <a:spLocks noGrp="1"/>
+          </p:cNvSpPr>
+          <p:nvPr>
+            <p:ph type="title"/>
+          </p:nvPr>
+        </p:nvSpPr>
+        <p:spPr/>
+        <p:txBody>
+          <a:bodyPr/>
+          <a:lstStyle/>
+          <a:p>
+            <a:r>
+              <a:rPr lang="nl-BE" dirty="0"/>
+              <a:t>Opbouw</a:t>
+            </a:r>
+          </a:p>
+        </p:txBody>
+      </p:sp>
+      <p:sp>
+        <p:nvSpPr>
+          <p:cNvPr id="3" name="Tijdelijke aanduiding voor inhoud 2"/>
+          <p:cNvSpPr>
+            <a:spLocks noGrp="1"/>
+          </p:cNvSpPr>
+          <p:nvPr>
+            <p:ph idx="1"/>
+          </p:nvPr>
+        </p:nvSpPr>
+        <p:spPr/>
+        <p:txBody>
+          <a:bodyPr/>
+          <a:lstStyle/>
+          <a:p>
+            <a:endParaRPr lang="nl-BE" dirty="0"/>
+          </a:p>
+        </p:txBody>
+      </p:sp>
+    </p:spTree>
+    <p:extLst>
+      <p:ext uri="{BB962C8B-B14F-4D97-AF65-F5344CB8AC3E}">
+        <p14:creationId xmlns:p14="http://schemas.microsoft.com/office/powerpoint/2010/main" val="3978210688"/>
+      </p:ext>
+    </p:extLst>
+  </p:cSld>
+  <p:clrMapOvr>
+    <a:masterClrMapping/>
+  </p:clrMapOvr>
+  <mc:AlternateContent xmlns:mc="http://schemas.openxmlformats.org/markup-compatibility/2006">
+    <mc:Choice xmlns:p159="http://schemas.microsoft.com/office/powerpoint/2015/09/main" Requires="p159">
+      <p:transition xmlns:p14="http://schemas.microsoft.com/office/powerpoint/2010/main" spd="slow" p14:dur="2000">
+        <p159:morph option="byObject"/>
+      </p:transition>
+    </mc:Choice>
+    <mc:Fallback>
+      <p:transition spd="slow">
+        <p:fade/>
+      </p:transition>
+    </mc:Fallback>
+  </mc:AlternateContent>
+</p:sld>
+</file>
+
+<file path=ppt/slides/slide7.xml><?xml version="1.0" encoding="utf-8"?>
+<p:sld xmlns:a="http://schemas.openxmlformats.org/drawingml/2006/main" xmlns:r="http://schemas.openxmlformats.org/officeDocument/2006/relationships" xmlns:p="http://schemas.openxmlformats.org/presentationml/2006/main">
+  <p:cSld>
+    <p:spTree>
+      <p:nvGrpSpPr>
+        <p:cNvPr id="1" name=""/>
+        <p:cNvGrpSpPr/>
+        <p:nvPr/>
+      </p:nvGrpSpPr>
+      <p:grpSpPr>
+        <a:xfrm>
+          <a:off x="0" y="0"/>
+          <a:ext cx="0" cy="0"/>
+          <a:chOff x="0" y="0"/>
+          <a:chExt cx="0" cy="0"/>
+        </a:xfrm>
+      </p:grpSpPr>
+      <p:sp>
+        <p:nvSpPr>
+          <p:cNvPr id="2" name="Titel 1"/>
+          <p:cNvSpPr>
+            <a:spLocks noGrp="1"/>
+          </p:cNvSpPr>
+          <p:nvPr>
+            <p:ph type="title"/>
+          </p:nvPr>
+        </p:nvSpPr>
         <p:spPr>
           <a:xfrm>
             <a:off x="3836050" y="2788444"/>
@@ -5625,7 +5909,7 @@
 </p:sld>
 </file>
 
-<file path=ppt/slides/slide6.xml><?xml version="1.0" encoding="utf-8"?>
+<file path=ppt/slides/slide8.xml><?xml version="1.0" encoding="utf-8"?>
 <p:sld xmlns:a="http://schemas.openxmlformats.org/drawingml/2006/main" xmlns:r="http://schemas.openxmlformats.org/officeDocument/2006/relationships" xmlns:p="http://schemas.openxmlformats.org/presentationml/2006/main">
   <p:cSld>
     <p:spTree>

</xml_diff>

<commit_message>
Foto's + Bewerkte video + ppt
</commit_message>
<xml_diff>
--- a/Documenten/Mobiele app.pptx
+++ b/Documenten/Mobiele app.pptx
@@ -5,17 +5,19 @@
     <p:sldMasterId id="2147483700" r:id="rId1"/>
   </p:sldMasterIdLst>
   <p:notesMasterIdLst>
-    <p:notesMasterId r:id="rId10"/>
+    <p:notesMasterId r:id="rId12"/>
   </p:notesMasterIdLst>
   <p:sldIdLst>
     <p:sldId id="256" r:id="rId2"/>
     <p:sldId id="257" r:id="rId3"/>
-    <p:sldId id="258" r:id="rId4"/>
-    <p:sldId id="262" r:id="rId5"/>
-    <p:sldId id="263" r:id="rId6"/>
-    <p:sldId id="259" r:id="rId7"/>
-    <p:sldId id="260" r:id="rId8"/>
-    <p:sldId id="261" r:id="rId9"/>
+    <p:sldId id="265" r:id="rId4"/>
+    <p:sldId id="258" r:id="rId5"/>
+    <p:sldId id="262" r:id="rId6"/>
+    <p:sldId id="263" r:id="rId7"/>
+    <p:sldId id="264" r:id="rId8"/>
+    <p:sldId id="259" r:id="rId9"/>
+    <p:sldId id="260" r:id="rId10"/>
+    <p:sldId id="261" r:id="rId11"/>
   </p:sldIdLst>
   <p:sldSz cx="12192000" cy="6858000"/>
   <p:notesSz cx="6858000" cy="9144000"/>
@@ -739,7 +741,7 @@
     </p:spTree>
     <p:extLst>
       <p:ext uri="{BB962C8B-B14F-4D97-AF65-F5344CB8AC3E}">
-        <p14:creationId xmlns:p14="http://schemas.microsoft.com/office/powerpoint/2010/main" val="2127353805"/>
+        <p14:creationId xmlns:p14="http://schemas.microsoft.com/office/powerpoint/2010/main" val="2481166422"/>
       </p:ext>
     </p:extLst>
   </p:cSld>
@@ -795,13 +797,8 @@
           <a:p>
             <a:r>
               <a:rPr lang="nl-BE" dirty="0"/>
-              <a:t>Demo</a:t>
-            </a:r>
-            <a:r>
-              <a:rPr lang="nl-BE" baseline="0" dirty="0"/>
-              <a:t> van de app geven. Via video of via gsm.</a:t>
-            </a:r>
-            <a:endParaRPr lang="nl-BE" dirty="0"/>
+              <a:t>Uitleggen wat de app juist doet</a:t>
+            </a:r>
           </a:p>
         </p:txBody>
       </p:sp>
@@ -822,7 +819,7 @@
           <a:p>
             <a:fld id="{920820BD-FF48-48FB-B400-48C5434C3C80}" type="slidenum">
               <a:rPr lang="nl-BE" smtClean="0"/>
-              <a:t>7</a:t>
+              <a:t>4</a:t>
             </a:fld>
             <a:endParaRPr lang="nl-BE"/>
           </a:p>
@@ -831,7 +828,7 @@
     </p:spTree>
     <p:extLst>
       <p:ext uri="{BB962C8B-B14F-4D97-AF65-F5344CB8AC3E}">
-        <p14:creationId xmlns:p14="http://schemas.microsoft.com/office/powerpoint/2010/main" val="1536355050"/>
+        <p14:creationId xmlns:p14="http://schemas.microsoft.com/office/powerpoint/2010/main" val="2127353805"/>
       </p:ext>
     </p:extLst>
   </p:cSld>
@@ -887,8 +884,13 @@
           <a:p>
             <a:r>
               <a:rPr lang="nl-BE" dirty="0"/>
-              <a:t>Lege eind die.</a:t>
-            </a:r>
+              <a:t>Demo</a:t>
+            </a:r>
+            <a:r>
+              <a:rPr lang="nl-BE" baseline="0" dirty="0"/>
+              <a:t> van de app geven. Via video of via gsm.</a:t>
+            </a:r>
+            <a:endParaRPr lang="nl-BE" dirty="0"/>
           </a:p>
         </p:txBody>
       </p:sp>
@@ -909,7 +911,94 @@
           <a:p>
             <a:fld id="{920820BD-FF48-48FB-B400-48C5434C3C80}" type="slidenum">
               <a:rPr lang="nl-BE" smtClean="0"/>
-              <a:t>8</a:t>
+              <a:t>9</a:t>
+            </a:fld>
+            <a:endParaRPr lang="nl-BE"/>
+          </a:p>
+        </p:txBody>
+      </p:sp>
+    </p:spTree>
+    <p:extLst>
+      <p:ext uri="{BB962C8B-B14F-4D97-AF65-F5344CB8AC3E}">
+        <p14:creationId xmlns:p14="http://schemas.microsoft.com/office/powerpoint/2010/main" val="1536355050"/>
+      </p:ext>
+    </p:extLst>
+  </p:cSld>
+  <p:clrMapOvr>
+    <a:masterClrMapping/>
+  </p:clrMapOvr>
+</p:notes>
+</file>
+
+<file path=ppt/notesSlides/notesSlide6.xml><?xml version="1.0" encoding="utf-8"?>
+<p:notes xmlns:a="http://schemas.openxmlformats.org/drawingml/2006/main" xmlns:r="http://schemas.openxmlformats.org/officeDocument/2006/relationships" xmlns:p="http://schemas.openxmlformats.org/presentationml/2006/main">
+  <p:cSld>
+    <p:spTree>
+      <p:nvGrpSpPr>
+        <p:cNvPr id="1" name=""/>
+        <p:cNvGrpSpPr/>
+        <p:nvPr/>
+      </p:nvGrpSpPr>
+      <p:grpSpPr>
+        <a:xfrm>
+          <a:off x="0" y="0"/>
+          <a:ext cx="0" cy="0"/>
+          <a:chOff x="0" y="0"/>
+          <a:chExt cx="0" cy="0"/>
+        </a:xfrm>
+      </p:grpSpPr>
+      <p:sp>
+        <p:nvSpPr>
+          <p:cNvPr id="2" name="Tijdelijke aanduiding voor dia-afbeelding 1"/>
+          <p:cNvSpPr>
+            <a:spLocks noGrp="1" noRot="1" noChangeAspect="1"/>
+          </p:cNvSpPr>
+          <p:nvPr>
+            <p:ph type="sldImg"/>
+          </p:nvPr>
+        </p:nvSpPr>
+        <p:spPr/>
+      </p:sp>
+      <p:sp>
+        <p:nvSpPr>
+          <p:cNvPr id="3" name="Tijdelijke aanduiding voor notities 2"/>
+          <p:cNvSpPr>
+            <a:spLocks noGrp="1"/>
+          </p:cNvSpPr>
+          <p:nvPr>
+            <p:ph type="body" idx="1"/>
+          </p:nvPr>
+        </p:nvSpPr>
+        <p:spPr/>
+        <p:txBody>
+          <a:bodyPr/>
+          <a:lstStyle/>
+          <a:p>
+            <a:r>
+              <a:rPr lang="nl-BE" dirty="0"/>
+              <a:t>Lege eind die.</a:t>
+            </a:r>
+          </a:p>
+        </p:txBody>
+      </p:sp>
+      <p:sp>
+        <p:nvSpPr>
+          <p:cNvPr id="4" name="Tijdelijke aanduiding voor dianummer 3"/>
+          <p:cNvSpPr>
+            <a:spLocks noGrp="1"/>
+          </p:cNvSpPr>
+          <p:nvPr>
+            <p:ph type="sldNum" sz="quarter" idx="10"/>
+          </p:nvPr>
+        </p:nvSpPr>
+        <p:spPr/>
+        <p:txBody>
+          <a:bodyPr/>
+          <a:lstStyle/>
+          <a:p>
+            <a:fld id="{920820BD-FF48-48FB-B400-48C5434C3C80}" type="slidenum">
+              <a:rPr lang="nl-BE" smtClean="0"/>
+              <a:t>10</a:t>
             </a:fld>
             <a:endParaRPr lang="nl-BE"/>
           </a:p>
@@ -5282,6 +5371,48 @@
 </p:sld>
 </file>
 
+<file path=ppt/slides/slide10.xml><?xml version="1.0" encoding="utf-8"?>
+<p:sld xmlns:a="http://schemas.openxmlformats.org/drawingml/2006/main" xmlns:r="http://schemas.openxmlformats.org/officeDocument/2006/relationships" xmlns:p="http://schemas.openxmlformats.org/presentationml/2006/main">
+  <p:cSld>
+    <p:spTree>
+      <p:nvGrpSpPr>
+        <p:cNvPr id="1" name=""/>
+        <p:cNvGrpSpPr/>
+        <p:nvPr/>
+      </p:nvGrpSpPr>
+      <p:grpSpPr>
+        <a:xfrm>
+          <a:off x="0" y="0"/>
+          <a:ext cx="0" cy="0"/>
+          <a:chOff x="0" y="0"/>
+          <a:chExt cx="0" cy="0"/>
+        </a:xfrm>
+      </p:grpSpPr>
+    </p:spTree>
+    <p:extLst>
+      <p:ext uri="{BB962C8B-B14F-4D97-AF65-F5344CB8AC3E}">
+        <p14:creationId xmlns:p14="http://schemas.microsoft.com/office/powerpoint/2010/main" val="3769555955"/>
+      </p:ext>
+    </p:extLst>
+  </p:cSld>
+  <p:clrMapOvr>
+    <a:masterClrMapping/>
+  </p:clrMapOvr>
+  <mc:AlternateContent xmlns:mc="http://schemas.openxmlformats.org/markup-compatibility/2006">
+    <mc:Choice xmlns:p159="http://schemas.microsoft.com/office/powerpoint/2015/09/main" Requires="p159">
+      <p:transition xmlns:p14="http://schemas.microsoft.com/office/powerpoint/2010/main" spd="slow" p14:dur="2000">
+        <p159:morph option="byObject"/>
+      </p:transition>
+    </mc:Choice>
+    <mc:Fallback>
+      <p:transition spd="slow">
+        <p:fade/>
+      </p:transition>
+    </mc:Fallback>
+  </mc:AlternateContent>
+</p:sld>
+</file>
+
 <file path=ppt/slides/slide2.xml><?xml version="1.0" encoding="utf-8"?>
 <p:sld xmlns:a="http://schemas.openxmlformats.org/drawingml/2006/main" xmlns:r="http://schemas.openxmlformats.org/officeDocument/2006/relationships" xmlns:p="http://schemas.openxmlformats.org/presentationml/2006/main">
   <p:cSld>
@@ -5443,6 +5574,297 @@
         </p:nvSpPr>
         <p:spPr>
           <a:xfrm>
+            <a:off x="1876777" y="1825625"/>
+            <a:ext cx="4095397" cy="3613150"/>
+          </a:xfrm>
+        </p:spPr>
+        <p:txBody>
+          <a:bodyPr/>
+          <a:lstStyle/>
+          <a:p>
+            <a:r>
+              <a:rPr lang="nl-BE" dirty="0"/>
+              <a:t>Splash scherm</a:t>
+            </a:r>
+          </a:p>
+          <a:p>
+            <a:pPr marL="0" indent="0">
+              <a:buNone/>
+            </a:pPr>
+            <a:endParaRPr lang="nl-BE" dirty="0"/>
+          </a:p>
+          <a:p>
+            <a:r>
+              <a:rPr lang="nl-BE" dirty="0"/>
+              <a:t>Logo organisatie</a:t>
+            </a:r>
+          </a:p>
+        </p:txBody>
+      </p:sp>
+      <p:pic>
+        <p:nvPicPr>
+          <p:cNvPr id="6" name="Afbeelding 5"/>
+          <p:cNvPicPr>
+            <a:picLocks noChangeAspect="1"/>
+          </p:cNvPicPr>
+          <p:nvPr/>
+        </p:nvPicPr>
+        <p:blipFill>
+          <a:blip r:embed="rId3">
+            <a:extLst>
+              <a:ext uri="{28A0092B-C50C-407E-A947-70E740481C1C}">
+                <a14:useLocalDpi xmlns:a14="http://schemas.microsoft.com/office/drawing/2010/main" val="0"/>
+              </a:ext>
+            </a:extLst>
+          </a:blip>
+          <a:stretch>
+            <a:fillRect/>
+          </a:stretch>
+        </p:blipFill>
+        <p:spPr>
+          <a:xfrm>
+            <a:off x="6251009" y="811376"/>
+            <a:ext cx="3452283" cy="5178425"/>
+          </a:xfrm>
+          <a:prstGeom prst="rect">
+            <a:avLst/>
+          </a:prstGeom>
+        </p:spPr>
+      </p:pic>
+    </p:spTree>
+    <p:extLst>
+      <p:ext uri="{BB962C8B-B14F-4D97-AF65-F5344CB8AC3E}">
+        <p14:creationId xmlns:p14="http://schemas.microsoft.com/office/powerpoint/2010/main" val="702116929"/>
+      </p:ext>
+    </p:extLst>
+  </p:cSld>
+  <p:clrMapOvr>
+    <a:masterClrMapping/>
+  </p:clrMapOvr>
+  <mc:AlternateContent xmlns:mc="http://schemas.openxmlformats.org/markup-compatibility/2006">
+    <mc:Choice xmlns:p159="http://schemas.microsoft.com/office/powerpoint/2015/09/main" Requires="p159">
+      <p:transition xmlns:p14="http://schemas.microsoft.com/office/powerpoint/2010/main" spd="slow" p14:dur="2000">
+        <p159:morph option="byObject"/>
+      </p:transition>
+    </mc:Choice>
+    <mc:Fallback>
+      <p:transition spd="slow">
+        <p:fade/>
+      </p:transition>
+    </mc:Fallback>
+  </mc:AlternateContent>
+  <p:timing>
+    <p:tnLst>
+      <p:par>
+        <p:cTn id="1" dur="indefinite" restart="never" nodeType="tmRoot">
+          <p:childTnLst>
+            <p:seq concurrent="1" nextAc="seek">
+              <p:cTn id="2" dur="indefinite" nodeType="mainSeq">
+                <p:childTnLst>
+                  <p:par>
+                    <p:cTn id="3" fill="hold">
+                      <p:stCondLst>
+                        <p:cond delay="indefinite"/>
+                        <p:cond evt="onBegin" delay="0">
+                          <p:tn val="2"/>
+                        </p:cond>
+                      </p:stCondLst>
+                      <p:childTnLst>
+                        <p:par>
+                          <p:cTn id="4" fill="hold">
+                            <p:stCondLst>
+                              <p:cond delay="0"/>
+                            </p:stCondLst>
+                            <p:childTnLst>
+                              <p:par>
+                                <p:cTn id="5" presetID="10" presetClass="entr" presetSubtype="0" fill="hold" grpId="0" nodeType="withEffect">
+                                  <p:stCondLst>
+                                    <p:cond delay="0"/>
+                                  </p:stCondLst>
+                                  <p:childTnLst>
+                                    <p:set>
+                                      <p:cBhvr>
+                                        <p:cTn id="6" dur="1" fill="hold">
+                                          <p:stCondLst>
+                                            <p:cond delay="0"/>
+                                          </p:stCondLst>
+                                        </p:cTn>
+                                        <p:tgtEl>
+                                          <p:spTgt spid="5">
+                                            <p:txEl>
+                                              <p:pRg st="0" end="0"/>
+                                            </p:txEl>
+                                          </p:spTgt>
+                                        </p:tgtEl>
+                                        <p:attrNameLst>
+                                          <p:attrName>style.visibility</p:attrName>
+                                        </p:attrNameLst>
+                                      </p:cBhvr>
+                                      <p:to>
+                                        <p:strVal val="visible"/>
+                                      </p:to>
+                                    </p:set>
+                                    <p:animEffect transition="in" filter="fade">
+                                      <p:cBhvr>
+                                        <p:cTn id="7" dur="500"/>
+                                        <p:tgtEl>
+                                          <p:spTgt spid="5">
+                                            <p:txEl>
+                                              <p:pRg st="0" end="0"/>
+                                            </p:txEl>
+                                          </p:spTgt>
+                                        </p:tgtEl>
+                                      </p:cBhvr>
+                                    </p:animEffect>
+                                  </p:childTnLst>
+                                </p:cTn>
+                              </p:par>
+                            </p:childTnLst>
+                          </p:cTn>
+                        </p:par>
+                      </p:childTnLst>
+                    </p:cTn>
+                  </p:par>
+                  <p:par>
+                    <p:cTn id="8" fill="hold">
+                      <p:stCondLst>
+                        <p:cond delay="indefinite"/>
+                      </p:stCondLst>
+                      <p:childTnLst>
+                        <p:par>
+                          <p:cTn id="9" fill="hold">
+                            <p:stCondLst>
+                              <p:cond delay="0"/>
+                            </p:stCondLst>
+                            <p:childTnLst>
+                              <p:par>
+                                <p:cTn id="10" presetID="10" presetClass="entr" presetSubtype="0" fill="hold" grpId="0" nodeType="clickEffect">
+                                  <p:stCondLst>
+                                    <p:cond delay="0"/>
+                                  </p:stCondLst>
+                                  <p:childTnLst>
+                                    <p:set>
+                                      <p:cBhvr>
+                                        <p:cTn id="11" dur="1" fill="hold">
+                                          <p:stCondLst>
+                                            <p:cond delay="0"/>
+                                          </p:stCondLst>
+                                        </p:cTn>
+                                        <p:tgtEl>
+                                          <p:spTgt spid="5">
+                                            <p:txEl>
+                                              <p:pRg st="2" end="2"/>
+                                            </p:txEl>
+                                          </p:spTgt>
+                                        </p:tgtEl>
+                                        <p:attrNameLst>
+                                          <p:attrName>style.visibility</p:attrName>
+                                        </p:attrNameLst>
+                                      </p:cBhvr>
+                                      <p:to>
+                                        <p:strVal val="visible"/>
+                                      </p:to>
+                                    </p:set>
+                                    <p:animEffect transition="in" filter="fade">
+                                      <p:cBhvr>
+                                        <p:cTn id="12" dur="500"/>
+                                        <p:tgtEl>
+                                          <p:spTgt spid="5">
+                                            <p:txEl>
+                                              <p:pRg st="2" end="2"/>
+                                            </p:txEl>
+                                          </p:spTgt>
+                                        </p:tgtEl>
+                                      </p:cBhvr>
+                                    </p:animEffect>
+                                  </p:childTnLst>
+                                </p:cTn>
+                              </p:par>
+                            </p:childTnLst>
+                          </p:cTn>
+                        </p:par>
+                      </p:childTnLst>
+                    </p:cTn>
+                  </p:par>
+                </p:childTnLst>
+              </p:cTn>
+              <p:prevCondLst>
+                <p:cond evt="onPrev" delay="0">
+                  <p:tgtEl>
+                    <p:sldTgt/>
+                  </p:tgtEl>
+                </p:cond>
+              </p:prevCondLst>
+              <p:nextCondLst>
+                <p:cond evt="onNext" delay="0">
+                  <p:tgtEl>
+                    <p:sldTgt/>
+                  </p:tgtEl>
+                </p:cond>
+              </p:nextCondLst>
+            </p:seq>
+          </p:childTnLst>
+        </p:cTn>
+      </p:par>
+    </p:tnLst>
+    <p:bldLst>
+      <p:bldP spid="5" grpId="0" uiExpand="1" build="p"/>
+    </p:bldLst>
+  </p:timing>
+</p:sld>
+</file>
+
+<file path=ppt/slides/slide4.xml><?xml version="1.0" encoding="utf-8"?>
+<p:sld xmlns:a="http://schemas.openxmlformats.org/drawingml/2006/main" xmlns:r="http://schemas.openxmlformats.org/officeDocument/2006/relationships" xmlns:p="http://schemas.openxmlformats.org/presentationml/2006/main">
+  <p:cSld>
+    <p:spTree>
+      <p:nvGrpSpPr>
+        <p:cNvPr id="1" name=""/>
+        <p:cNvGrpSpPr/>
+        <p:nvPr/>
+      </p:nvGrpSpPr>
+      <p:grpSpPr>
+        <a:xfrm>
+          <a:off x="0" y="0"/>
+          <a:ext cx="0" cy="0"/>
+          <a:chOff x="0" y="0"/>
+          <a:chExt cx="0" cy="0"/>
+        </a:xfrm>
+      </p:grpSpPr>
+      <p:sp>
+        <p:nvSpPr>
+          <p:cNvPr id="4" name="Titel 3"/>
+          <p:cNvSpPr>
+            <a:spLocks noGrp="1"/>
+          </p:cNvSpPr>
+          <p:nvPr>
+            <p:ph type="title"/>
+          </p:nvPr>
+        </p:nvSpPr>
+        <p:spPr/>
+        <p:txBody>
+          <a:bodyPr/>
+          <a:lstStyle/>
+          <a:p>
+            <a:r>
+              <a:rPr lang="nl-BE" dirty="0"/>
+              <a:t>Werking</a:t>
+            </a:r>
+          </a:p>
+        </p:txBody>
+      </p:sp>
+      <p:sp>
+        <p:nvSpPr>
+          <p:cNvPr id="5" name="Tijdelijke aanduiding voor inhoud 4"/>
+          <p:cNvSpPr>
+            <a:spLocks noGrp="1"/>
+          </p:cNvSpPr>
+          <p:nvPr>
+            <p:ph idx="1"/>
+          </p:nvPr>
+        </p:nvSpPr>
+        <p:spPr>
+          <a:xfrm>
             <a:off x="1876778" y="1825625"/>
             <a:ext cx="3032574" cy="651246"/>
           </a:xfrm>
@@ -5492,128 +5914,6 @@
     <p:extLst>
       <p:ext uri="{BB962C8B-B14F-4D97-AF65-F5344CB8AC3E}">
         <p14:creationId xmlns:p14="http://schemas.microsoft.com/office/powerpoint/2010/main" val="1565538811"/>
-      </p:ext>
-    </p:extLst>
-  </p:cSld>
-  <p:clrMapOvr>
-    <a:masterClrMapping/>
-  </p:clrMapOvr>
-  <mc:AlternateContent xmlns:mc="http://schemas.openxmlformats.org/markup-compatibility/2006">
-    <mc:Choice xmlns:p159="http://schemas.microsoft.com/office/powerpoint/2015/09/main" Requires="p159">
-      <p:transition xmlns:p14="http://schemas.microsoft.com/office/powerpoint/2010/main" spd="slow" p14:dur="2000">
-        <p159:morph option="byObject"/>
-      </p:transition>
-    </mc:Choice>
-    <mc:Fallback>
-      <p:transition spd="slow">
-        <p:fade/>
-      </p:transition>
-    </mc:Fallback>
-  </mc:AlternateContent>
-</p:sld>
-</file>
-
-<file path=ppt/slides/slide4.xml><?xml version="1.0" encoding="utf-8"?>
-<p:sld xmlns:a="http://schemas.openxmlformats.org/drawingml/2006/main" xmlns:r="http://schemas.openxmlformats.org/officeDocument/2006/relationships" xmlns:p="http://schemas.openxmlformats.org/presentationml/2006/main">
-  <p:cSld>
-    <p:spTree>
-      <p:nvGrpSpPr>
-        <p:cNvPr id="1" name=""/>
-        <p:cNvGrpSpPr/>
-        <p:nvPr/>
-      </p:nvGrpSpPr>
-      <p:grpSpPr>
-        <a:xfrm>
-          <a:off x="0" y="0"/>
-          <a:ext cx="0" cy="0"/>
-          <a:chOff x="0" y="0"/>
-          <a:chExt cx="0" cy="0"/>
-        </a:xfrm>
-      </p:grpSpPr>
-      <p:sp>
-        <p:nvSpPr>
-          <p:cNvPr id="2" name="Titel 1"/>
-          <p:cNvSpPr>
-            <a:spLocks noGrp="1"/>
-          </p:cNvSpPr>
-          <p:nvPr>
-            <p:ph type="title"/>
-          </p:nvPr>
-        </p:nvSpPr>
-        <p:spPr/>
-        <p:txBody>
-          <a:bodyPr/>
-          <a:lstStyle/>
-          <a:p>
-            <a:r>
-              <a:rPr lang="nl-BE" dirty="0"/>
-              <a:t>Werking</a:t>
-            </a:r>
-            <a:endParaRPr lang="nl-NL" dirty="0"/>
-          </a:p>
-        </p:txBody>
-      </p:sp>
-      <p:sp>
-        <p:nvSpPr>
-          <p:cNvPr id="3" name="Tijdelijke aanduiding voor inhoud 2"/>
-          <p:cNvSpPr>
-            <a:spLocks noGrp="1"/>
-          </p:cNvSpPr>
-          <p:nvPr>
-            <p:ph idx="1"/>
-          </p:nvPr>
-        </p:nvSpPr>
-        <p:spPr>
-          <a:xfrm>
-            <a:off x="1876777" y="1825624"/>
-            <a:ext cx="2704101" cy="509203"/>
-          </a:xfrm>
-        </p:spPr>
-        <p:txBody>
-          <a:bodyPr/>
-          <a:lstStyle/>
-          <a:p>
-            <a:r>
-              <a:rPr lang="nl-NL" dirty="0"/>
-              <a:t>Over scherm</a:t>
-            </a:r>
-          </a:p>
-        </p:txBody>
-      </p:sp>
-      <p:pic>
-        <p:nvPicPr>
-          <p:cNvPr id="5" name="Afbeelding 4"/>
-          <p:cNvPicPr>
-            <a:picLocks noChangeAspect="1"/>
-          </p:cNvPicPr>
-          <p:nvPr/>
-        </p:nvPicPr>
-        <p:blipFill>
-          <a:blip r:embed="rId2">
-            <a:extLst>
-              <a:ext uri="{28A0092B-C50C-407E-A947-70E740481C1C}">
-                <a14:useLocalDpi xmlns:a14="http://schemas.microsoft.com/office/drawing/2010/main" val="0"/>
-              </a:ext>
-            </a:extLst>
-          </a:blip>
-          <a:stretch>
-            <a:fillRect/>
-          </a:stretch>
-        </p:blipFill>
-        <p:spPr>
-          <a:xfrm>
-            <a:off x="6288400" y="365125"/>
-            <a:ext cx="3414150" cy="6069600"/>
-          </a:xfrm>
-          <a:prstGeom prst="rect">
-            <a:avLst/>
-          </a:prstGeom>
-        </p:spPr>
-      </p:pic>
-    </p:spTree>
-    <p:extLst>
-      <p:ext uri="{BB962C8B-B14F-4D97-AF65-F5344CB8AC3E}">
-        <p14:creationId xmlns:p14="http://schemas.microsoft.com/office/powerpoint/2010/main" val="1870604398"/>
       </p:ext>
     </p:extLst>
   </p:cSld>
@@ -5697,14 +5997,14 @@
           <a:p>
             <a:r>
               <a:rPr lang="nl-NL" dirty="0"/>
-              <a:t>Route scherm</a:t>
+              <a:t>Over scherm</a:t>
             </a:r>
           </a:p>
         </p:txBody>
       </p:sp>
       <p:pic>
         <p:nvPicPr>
-          <p:cNvPr id="6" name="Afbeelding 5"/>
+          <p:cNvPr id="5" name="Afbeelding 4"/>
           <p:cNvPicPr>
             <a:picLocks noChangeAspect="1"/>
           </p:cNvPicPr>
@@ -5735,7 +6035,7 @@
     </p:spTree>
     <p:extLst>
       <p:ext uri="{BB962C8B-B14F-4D97-AF65-F5344CB8AC3E}">
-        <p14:creationId xmlns:p14="http://schemas.microsoft.com/office/powerpoint/2010/main" val="3654331092"/>
+        <p14:creationId xmlns:p14="http://schemas.microsoft.com/office/powerpoint/2010/main" val="1870604398"/>
       </p:ext>
     </p:extLst>
   </p:cSld>
@@ -5791,8 +6091,9 @@
           <a:p>
             <a:r>
               <a:rPr lang="nl-BE" dirty="0"/>
-              <a:t>Opbouw</a:t>
-            </a:r>
+              <a:t>Werking</a:t>
+            </a:r>
+            <a:endParaRPr lang="nl-NL" dirty="0"/>
           </a:p>
         </p:txBody>
       </p:sp>
@@ -5806,15 +6107,588 @@
             <p:ph idx="1"/>
           </p:nvPr>
         </p:nvSpPr>
-        <p:spPr/>
+        <p:spPr>
+          <a:xfrm>
+            <a:off x="1876777" y="1825624"/>
+            <a:ext cx="2704101" cy="509203"/>
+          </a:xfrm>
+        </p:spPr>
         <p:txBody>
           <a:bodyPr/>
           <a:lstStyle/>
           <a:p>
+            <a:r>
+              <a:rPr lang="nl-NL" dirty="0"/>
+              <a:t>Route scherm</a:t>
+            </a:r>
+          </a:p>
+        </p:txBody>
+      </p:sp>
+      <p:pic>
+        <p:nvPicPr>
+          <p:cNvPr id="6" name="Afbeelding 5"/>
+          <p:cNvPicPr>
+            <a:picLocks noChangeAspect="1"/>
+          </p:cNvPicPr>
+          <p:nvPr/>
+        </p:nvPicPr>
+        <p:blipFill>
+          <a:blip r:embed="rId2">
+            <a:extLst>
+              <a:ext uri="{28A0092B-C50C-407E-A947-70E740481C1C}">
+                <a14:useLocalDpi xmlns:a14="http://schemas.microsoft.com/office/drawing/2010/main" val="0"/>
+              </a:ext>
+            </a:extLst>
+          </a:blip>
+          <a:stretch>
+            <a:fillRect/>
+          </a:stretch>
+        </p:blipFill>
+        <p:spPr>
+          <a:xfrm>
+            <a:off x="6288400" y="365125"/>
+            <a:ext cx="3414150" cy="6069600"/>
+          </a:xfrm>
+          <a:prstGeom prst="rect">
+            <a:avLst/>
+          </a:prstGeom>
+        </p:spPr>
+      </p:pic>
+      <p:pic>
+        <p:nvPicPr>
+          <p:cNvPr id="8" name="Afbeelding 7"/>
+          <p:cNvPicPr>
+            <a:picLocks noChangeAspect="1"/>
+          </p:cNvPicPr>
+          <p:nvPr/>
+        </p:nvPicPr>
+        <p:blipFill>
+          <a:blip r:embed="rId3">
+            <a:extLst>
+              <a:ext uri="{28A0092B-C50C-407E-A947-70E740481C1C}">
+                <a14:useLocalDpi xmlns:a14="http://schemas.microsoft.com/office/drawing/2010/main" val="0"/>
+              </a:ext>
+            </a:extLst>
+          </a:blip>
+          <a:stretch>
+            <a:fillRect/>
+          </a:stretch>
+        </p:blipFill>
+        <p:spPr>
+          <a:xfrm>
+            <a:off x="6288400" y="365125"/>
+            <a:ext cx="3414149" cy="6069600"/>
+          </a:xfrm>
+          <a:prstGeom prst="rect">
+            <a:avLst/>
+          </a:prstGeom>
+        </p:spPr>
+      </p:pic>
+    </p:spTree>
+    <p:extLst>
+      <p:ext uri="{BB962C8B-B14F-4D97-AF65-F5344CB8AC3E}">
+        <p14:creationId xmlns:p14="http://schemas.microsoft.com/office/powerpoint/2010/main" val="3654331092"/>
+      </p:ext>
+    </p:extLst>
+  </p:cSld>
+  <p:clrMapOvr>
+    <a:masterClrMapping/>
+  </p:clrMapOvr>
+  <mc:AlternateContent xmlns:mc="http://schemas.openxmlformats.org/markup-compatibility/2006">
+    <mc:Choice xmlns:p159="http://schemas.microsoft.com/office/powerpoint/2015/09/main" Requires="p159">
+      <p:transition xmlns:p14="http://schemas.microsoft.com/office/powerpoint/2010/main" spd="slow" p14:dur="2000">
+        <p159:morph option="byObject"/>
+      </p:transition>
+    </mc:Choice>
+    <mc:Fallback>
+      <p:transition spd="slow">
+        <p:fade/>
+      </p:transition>
+    </mc:Fallback>
+  </mc:AlternateContent>
+  <p:timing>
+    <p:tnLst>
+      <p:par>
+        <p:cTn id="1" dur="indefinite" restart="never" nodeType="tmRoot">
+          <p:childTnLst>
+            <p:seq concurrent="1" nextAc="seek">
+              <p:cTn id="2" dur="indefinite" nodeType="mainSeq">
+                <p:childTnLst>
+                  <p:par>
+                    <p:cTn id="3" fill="hold">
+                      <p:stCondLst>
+                        <p:cond delay="indefinite"/>
+                      </p:stCondLst>
+                      <p:childTnLst>
+                        <p:par>
+                          <p:cTn id="4" fill="hold">
+                            <p:stCondLst>
+                              <p:cond delay="0"/>
+                            </p:stCondLst>
+                            <p:childTnLst>
+                              <p:par>
+                                <p:cTn id="5" presetID="10" presetClass="entr" presetSubtype="0" fill="hold" nodeType="clickEffect">
+                                  <p:stCondLst>
+                                    <p:cond delay="0"/>
+                                  </p:stCondLst>
+                                  <p:childTnLst>
+                                    <p:set>
+                                      <p:cBhvr>
+                                        <p:cTn id="6" dur="1" fill="hold">
+                                          <p:stCondLst>
+                                            <p:cond delay="0"/>
+                                          </p:stCondLst>
+                                        </p:cTn>
+                                        <p:tgtEl>
+                                          <p:spTgt spid="8"/>
+                                        </p:tgtEl>
+                                        <p:attrNameLst>
+                                          <p:attrName>style.visibility</p:attrName>
+                                        </p:attrNameLst>
+                                      </p:cBhvr>
+                                      <p:to>
+                                        <p:strVal val="visible"/>
+                                      </p:to>
+                                    </p:set>
+                                    <p:animEffect transition="in" filter="fade">
+                                      <p:cBhvr>
+                                        <p:cTn id="7" dur="500"/>
+                                        <p:tgtEl>
+                                          <p:spTgt spid="8"/>
+                                        </p:tgtEl>
+                                      </p:cBhvr>
+                                    </p:animEffect>
+                                  </p:childTnLst>
+                                </p:cTn>
+                              </p:par>
+                            </p:childTnLst>
+                          </p:cTn>
+                        </p:par>
+                      </p:childTnLst>
+                    </p:cTn>
+                  </p:par>
+                </p:childTnLst>
+              </p:cTn>
+              <p:prevCondLst>
+                <p:cond evt="onPrev" delay="0">
+                  <p:tgtEl>
+                    <p:sldTgt/>
+                  </p:tgtEl>
+                </p:cond>
+              </p:prevCondLst>
+              <p:nextCondLst>
+                <p:cond evt="onNext" delay="0">
+                  <p:tgtEl>
+                    <p:sldTgt/>
+                  </p:tgtEl>
+                </p:cond>
+              </p:nextCondLst>
+            </p:seq>
+          </p:childTnLst>
+        </p:cTn>
+      </p:par>
+    </p:tnLst>
+  </p:timing>
+</p:sld>
+</file>
+
+<file path=ppt/slides/slide7.xml><?xml version="1.0" encoding="utf-8"?>
+<p:sld xmlns:a="http://schemas.openxmlformats.org/drawingml/2006/main" xmlns:r="http://schemas.openxmlformats.org/officeDocument/2006/relationships" xmlns:p="http://schemas.openxmlformats.org/presentationml/2006/main">
+  <p:cSld>
+    <p:spTree>
+      <p:nvGrpSpPr>
+        <p:cNvPr id="1" name=""/>
+        <p:cNvGrpSpPr/>
+        <p:nvPr/>
+      </p:nvGrpSpPr>
+      <p:grpSpPr>
+        <a:xfrm>
+          <a:off x="0" y="0"/>
+          <a:ext cx="0" cy="0"/>
+          <a:chOff x="0" y="0"/>
+          <a:chExt cx="0" cy="0"/>
+        </a:xfrm>
+      </p:grpSpPr>
+      <p:sp>
+        <p:nvSpPr>
+          <p:cNvPr id="2" name="Titel 1"/>
+          <p:cNvSpPr>
+            <a:spLocks noGrp="1"/>
+          </p:cNvSpPr>
+          <p:nvPr>
+            <p:ph type="title"/>
+          </p:nvPr>
+        </p:nvSpPr>
+        <p:spPr/>
+        <p:txBody>
+          <a:bodyPr/>
+          <a:lstStyle/>
+          <a:p>
+            <a:r>
+              <a:rPr lang="nl-BE" dirty="0"/>
+              <a:t>Werking</a:t>
+            </a:r>
+            <a:endParaRPr lang="nl-NL" dirty="0"/>
+          </a:p>
+        </p:txBody>
+      </p:sp>
+      <p:sp>
+        <p:nvSpPr>
+          <p:cNvPr id="3" name="Tijdelijke aanduiding voor inhoud 2"/>
+          <p:cNvSpPr>
+            <a:spLocks noGrp="1"/>
+          </p:cNvSpPr>
+          <p:nvPr>
+            <p:ph idx="1"/>
+          </p:nvPr>
+        </p:nvSpPr>
+        <p:spPr>
+          <a:xfrm>
+            <a:off x="1876777" y="1825624"/>
+            <a:ext cx="2704101" cy="509203"/>
+          </a:xfrm>
+        </p:spPr>
+        <p:txBody>
+          <a:bodyPr/>
+          <a:lstStyle/>
+          <a:p>
+            <a:r>
+              <a:rPr lang="nl-NL" dirty="0"/>
+              <a:t>Route scherm</a:t>
+            </a:r>
+          </a:p>
+        </p:txBody>
+      </p:sp>
+      <p:pic>
+        <p:nvPicPr>
+          <p:cNvPr id="6" name="Afbeelding 5"/>
+          <p:cNvPicPr>
+            <a:picLocks noChangeAspect="1"/>
+          </p:cNvPicPr>
+          <p:nvPr/>
+        </p:nvPicPr>
+        <p:blipFill>
+          <a:blip r:embed="rId2">
+            <a:extLst>
+              <a:ext uri="{28A0092B-C50C-407E-A947-70E740481C1C}">
+                <a14:useLocalDpi xmlns:a14="http://schemas.microsoft.com/office/drawing/2010/main" val="0"/>
+              </a:ext>
+            </a:extLst>
+          </a:blip>
+          <a:stretch>
+            <a:fillRect/>
+          </a:stretch>
+        </p:blipFill>
+        <p:spPr>
+          <a:xfrm>
+            <a:off x="6288400" y="365125"/>
+            <a:ext cx="3414150" cy="6069600"/>
+          </a:xfrm>
+          <a:prstGeom prst="rect">
+            <a:avLst/>
+          </a:prstGeom>
+        </p:spPr>
+      </p:pic>
+      <p:pic>
+        <p:nvPicPr>
+          <p:cNvPr id="8" name="Afbeelding 7"/>
+          <p:cNvPicPr>
+            <a:picLocks noChangeAspect="1"/>
+          </p:cNvPicPr>
+          <p:nvPr/>
+        </p:nvPicPr>
+        <p:blipFill>
+          <a:blip r:embed="rId3">
+            <a:extLst>
+              <a:ext uri="{28A0092B-C50C-407E-A947-70E740481C1C}">
+                <a14:useLocalDpi xmlns:a14="http://schemas.microsoft.com/office/drawing/2010/main" val="0"/>
+              </a:ext>
+            </a:extLst>
+          </a:blip>
+          <a:stretch>
+            <a:fillRect/>
+          </a:stretch>
+        </p:blipFill>
+        <p:spPr>
+          <a:xfrm>
+            <a:off x="6288400" y="365125"/>
+            <a:ext cx="3414149" cy="6069600"/>
+          </a:xfrm>
+          <a:prstGeom prst="rect">
+            <a:avLst/>
+          </a:prstGeom>
+        </p:spPr>
+      </p:pic>
+    </p:spTree>
+    <p:extLst>
+      <p:ext uri="{BB962C8B-B14F-4D97-AF65-F5344CB8AC3E}">
+        <p14:creationId xmlns:p14="http://schemas.microsoft.com/office/powerpoint/2010/main" val="3825705876"/>
+      </p:ext>
+    </p:extLst>
+  </p:cSld>
+  <p:clrMapOvr>
+    <a:masterClrMapping/>
+  </p:clrMapOvr>
+  <mc:AlternateContent xmlns:mc="http://schemas.openxmlformats.org/markup-compatibility/2006">
+    <mc:Choice xmlns:p159="http://schemas.microsoft.com/office/powerpoint/2015/09/main" Requires="p159">
+      <p:transition xmlns:p14="http://schemas.microsoft.com/office/powerpoint/2010/main" spd="slow" p14:dur="2000">
+        <p159:morph option="byObject"/>
+      </p:transition>
+    </mc:Choice>
+    <mc:Fallback>
+      <p:transition spd="slow">
+        <p:fade/>
+      </p:transition>
+    </mc:Fallback>
+  </mc:AlternateContent>
+  <p:timing>
+    <p:tnLst>
+      <p:par>
+        <p:cTn id="1" dur="indefinite" restart="never" nodeType="tmRoot">
+          <p:childTnLst>
+            <p:seq concurrent="1" nextAc="seek">
+              <p:cTn id="2" dur="indefinite" nodeType="mainSeq">
+                <p:childTnLst>
+                  <p:par>
+                    <p:cTn id="3" fill="hold">
+                      <p:stCondLst>
+                        <p:cond delay="indefinite"/>
+                      </p:stCondLst>
+                      <p:childTnLst>
+                        <p:par>
+                          <p:cTn id="4" fill="hold">
+                            <p:stCondLst>
+                              <p:cond delay="0"/>
+                            </p:stCondLst>
+                            <p:childTnLst>
+                              <p:par>
+                                <p:cTn id="5" presetID="10" presetClass="entr" presetSubtype="0" fill="hold" nodeType="clickEffect">
+                                  <p:stCondLst>
+                                    <p:cond delay="0"/>
+                                  </p:stCondLst>
+                                  <p:childTnLst>
+                                    <p:set>
+                                      <p:cBhvr>
+                                        <p:cTn id="6" dur="1" fill="hold">
+                                          <p:stCondLst>
+                                            <p:cond delay="0"/>
+                                          </p:stCondLst>
+                                        </p:cTn>
+                                        <p:tgtEl>
+                                          <p:spTgt spid="8"/>
+                                        </p:tgtEl>
+                                        <p:attrNameLst>
+                                          <p:attrName>style.visibility</p:attrName>
+                                        </p:attrNameLst>
+                                      </p:cBhvr>
+                                      <p:to>
+                                        <p:strVal val="visible"/>
+                                      </p:to>
+                                    </p:set>
+                                    <p:animEffect transition="in" filter="fade">
+                                      <p:cBhvr>
+                                        <p:cTn id="7" dur="500"/>
+                                        <p:tgtEl>
+                                          <p:spTgt spid="8"/>
+                                        </p:tgtEl>
+                                      </p:cBhvr>
+                                    </p:animEffect>
+                                  </p:childTnLst>
+                                </p:cTn>
+                              </p:par>
+                            </p:childTnLst>
+                          </p:cTn>
+                        </p:par>
+                      </p:childTnLst>
+                    </p:cTn>
+                  </p:par>
+                </p:childTnLst>
+              </p:cTn>
+              <p:prevCondLst>
+                <p:cond evt="onPrev" delay="0">
+                  <p:tgtEl>
+                    <p:sldTgt/>
+                  </p:tgtEl>
+                </p:cond>
+              </p:prevCondLst>
+              <p:nextCondLst>
+                <p:cond evt="onNext" delay="0">
+                  <p:tgtEl>
+                    <p:sldTgt/>
+                  </p:tgtEl>
+                </p:cond>
+              </p:nextCondLst>
+            </p:seq>
+          </p:childTnLst>
+        </p:cTn>
+      </p:par>
+    </p:tnLst>
+  </p:timing>
+</p:sld>
+</file>
+
+<file path=ppt/slides/slide8.xml><?xml version="1.0" encoding="utf-8"?>
+<p:sld xmlns:a="http://schemas.openxmlformats.org/drawingml/2006/main" xmlns:r="http://schemas.openxmlformats.org/officeDocument/2006/relationships" xmlns:p="http://schemas.openxmlformats.org/presentationml/2006/main">
+  <p:cSld>
+    <p:spTree>
+      <p:nvGrpSpPr>
+        <p:cNvPr id="1" name=""/>
+        <p:cNvGrpSpPr/>
+        <p:nvPr/>
+      </p:nvGrpSpPr>
+      <p:grpSpPr>
+        <a:xfrm>
+          <a:off x="0" y="0"/>
+          <a:ext cx="0" cy="0"/>
+          <a:chOff x="0" y="0"/>
+          <a:chExt cx="0" cy="0"/>
+        </a:xfrm>
+      </p:grpSpPr>
+      <p:sp>
+        <p:nvSpPr>
+          <p:cNvPr id="2" name="Titel 1"/>
+          <p:cNvSpPr>
+            <a:spLocks noGrp="1"/>
+          </p:cNvSpPr>
+          <p:nvPr>
+            <p:ph type="title"/>
+          </p:nvPr>
+        </p:nvSpPr>
+        <p:spPr/>
+        <p:txBody>
+          <a:bodyPr/>
+          <a:lstStyle/>
+          <a:p>
+            <a:r>
+              <a:rPr lang="nl-BE" dirty="0"/>
+              <a:t>Opbouw</a:t>
+            </a:r>
+          </a:p>
+        </p:txBody>
+      </p:sp>
+      <p:sp>
+        <p:nvSpPr>
+          <p:cNvPr id="3" name="Tijdelijke aanduiding voor inhoud 2"/>
+          <p:cNvSpPr>
+            <a:spLocks noGrp="1"/>
+          </p:cNvSpPr>
+          <p:nvPr>
+            <p:ph idx="1"/>
+          </p:nvPr>
+        </p:nvSpPr>
+        <p:spPr>
+          <a:xfrm>
+            <a:off x="1876777" y="1825624"/>
+            <a:ext cx="3209573" cy="3746501"/>
+          </a:xfrm>
+        </p:spPr>
+        <p:txBody>
+          <a:bodyPr/>
+          <a:lstStyle/>
+          <a:p>
+            <a:r>
+              <a:rPr lang="nl-BE" dirty="0"/>
+              <a:t>Content screens</a:t>
+            </a:r>
+          </a:p>
+          <a:p>
             <a:endParaRPr lang="nl-BE" dirty="0"/>
           </a:p>
-        </p:txBody>
-      </p:sp>
+          <a:p>
+            <a:r>
+              <a:rPr lang="nl-BE" dirty="0"/>
+              <a:t>Html</a:t>
+            </a:r>
+          </a:p>
+          <a:p>
+            <a:r>
+              <a:rPr lang="nl-BE" dirty="0"/>
+              <a:t>YouTube</a:t>
+            </a:r>
+          </a:p>
+          <a:p>
+            <a:r>
+              <a:rPr lang="nl-BE" dirty="0"/>
+              <a:t>Foto</a:t>
+            </a:r>
+          </a:p>
+          <a:p>
+            <a:r>
+              <a:rPr lang="nl-BE" dirty="0"/>
+              <a:t>Audio</a:t>
+            </a:r>
+          </a:p>
+          <a:p>
+            <a:r>
+              <a:rPr lang="nl-BE" dirty="0"/>
+              <a:t>Video</a:t>
+            </a:r>
+          </a:p>
+        </p:txBody>
+      </p:sp>
+      <p:pic>
+        <p:nvPicPr>
+          <p:cNvPr id="6" name="Afbeelding 5"/>
+          <p:cNvPicPr>
+            <a:picLocks noChangeAspect="1"/>
+          </p:cNvPicPr>
+          <p:nvPr/>
+        </p:nvPicPr>
+        <p:blipFill>
+          <a:blip r:embed="rId4">
+            <a:extLst>
+              <a:ext uri="{28A0092B-C50C-407E-A947-70E740481C1C}">
+                <a14:useLocalDpi xmlns:a14="http://schemas.microsoft.com/office/drawing/2010/main" val="0"/>
+              </a:ext>
+            </a:extLst>
+          </a:blip>
+          <a:stretch>
+            <a:fillRect/>
+          </a:stretch>
+        </p:blipFill>
+        <p:spPr>
+          <a:xfrm>
+            <a:off x="0" y="0"/>
+            <a:ext cx="12192000" cy="6858000"/>
+          </a:xfrm>
+          <a:prstGeom prst="rect">
+            <a:avLst/>
+          </a:prstGeom>
+        </p:spPr>
+      </p:pic>
+      <p:pic>
+        <p:nvPicPr>
+          <p:cNvPr id="4" name="WerkingsVideo">
+            <a:hlinkClick r:id="" action="ppaction://media"/>
+          </p:cNvPr>
+          <p:cNvPicPr>
+            <a:picLocks noChangeAspect="1"/>
+          </p:cNvPicPr>
+          <p:nvPr>
+            <a:videoFile r:link="rId2"/>
+            <p:extLst>
+              <p:ext uri="{DAA4B4D4-6D71-4841-9C94-3DE7FCFB9230}">
+                <p14:media xmlns:p14="http://schemas.microsoft.com/office/powerpoint/2010/main" r:embed="rId1"/>
+              </p:ext>
+            </p:extLst>
+          </p:nvPr>
+        </p:nvPicPr>
+        <p:blipFill>
+          <a:blip r:embed="rId5"/>
+          <a:stretch>
+            <a:fillRect/>
+          </a:stretch>
+        </p:blipFill>
+        <p:spPr>
+          <a:xfrm>
+            <a:off x="4184650" y="0"/>
+            <a:ext cx="3822700" cy="6858000"/>
+          </a:xfrm>
+          <a:prstGeom prst="rect">
+            <a:avLst/>
+          </a:prstGeom>
+        </p:spPr>
+      </p:pic>
     </p:spTree>
     <p:extLst>
       <p:ext uri="{BB962C8B-B14F-4D97-AF65-F5344CB8AC3E}">
@@ -5837,10 +6711,502 @@
       </p:transition>
     </mc:Fallback>
   </mc:AlternateContent>
+  <p:timing>
+    <p:tnLst>
+      <p:par>
+        <p:cTn id="1" dur="indefinite" restart="never" nodeType="tmRoot">
+          <p:childTnLst>
+            <p:seq concurrent="1" nextAc="seek">
+              <p:cTn id="2" dur="indefinite" nodeType="mainSeq">
+                <p:childTnLst>
+                  <p:par>
+                    <p:cTn id="3" fill="hold">
+                      <p:stCondLst>
+                        <p:cond delay="indefinite"/>
+                        <p:cond evt="onBegin" delay="0">
+                          <p:tn val="2"/>
+                        </p:cond>
+                      </p:stCondLst>
+                      <p:childTnLst>
+                        <p:par>
+                          <p:cTn id="4" fill="hold">
+                            <p:stCondLst>
+                              <p:cond delay="0"/>
+                            </p:stCondLst>
+                            <p:childTnLst>
+                              <p:par>
+                                <p:cTn id="5" presetID="10" presetClass="entr" presetSubtype="0" fill="hold" grpId="0" nodeType="withEffect">
+                                  <p:stCondLst>
+                                    <p:cond delay="0"/>
+                                  </p:stCondLst>
+                                  <p:childTnLst>
+                                    <p:set>
+                                      <p:cBhvr>
+                                        <p:cTn id="6" dur="1" fill="hold">
+                                          <p:stCondLst>
+                                            <p:cond delay="0"/>
+                                          </p:stCondLst>
+                                        </p:cTn>
+                                        <p:tgtEl>
+                                          <p:spTgt spid="3">
+                                            <p:txEl>
+                                              <p:pRg st="0" end="0"/>
+                                            </p:txEl>
+                                          </p:spTgt>
+                                        </p:tgtEl>
+                                        <p:attrNameLst>
+                                          <p:attrName>style.visibility</p:attrName>
+                                        </p:attrNameLst>
+                                      </p:cBhvr>
+                                      <p:to>
+                                        <p:strVal val="visible"/>
+                                      </p:to>
+                                    </p:set>
+                                    <p:animEffect transition="in" filter="fade">
+                                      <p:cBhvr>
+                                        <p:cTn id="7" dur="500"/>
+                                        <p:tgtEl>
+                                          <p:spTgt spid="3">
+                                            <p:txEl>
+                                              <p:pRg st="0" end="0"/>
+                                            </p:txEl>
+                                          </p:spTgt>
+                                        </p:tgtEl>
+                                      </p:cBhvr>
+                                    </p:animEffect>
+                                  </p:childTnLst>
+                                </p:cTn>
+                              </p:par>
+                            </p:childTnLst>
+                          </p:cTn>
+                        </p:par>
+                      </p:childTnLst>
+                    </p:cTn>
+                  </p:par>
+                  <p:par>
+                    <p:cTn id="8" fill="hold">
+                      <p:stCondLst>
+                        <p:cond delay="indefinite"/>
+                      </p:stCondLst>
+                      <p:childTnLst>
+                        <p:par>
+                          <p:cTn id="9" fill="hold">
+                            <p:stCondLst>
+                              <p:cond delay="0"/>
+                            </p:stCondLst>
+                            <p:childTnLst>
+                              <p:par>
+                                <p:cTn id="10" presetID="10" presetClass="entr" presetSubtype="0" fill="hold" grpId="0" nodeType="clickEffect">
+                                  <p:stCondLst>
+                                    <p:cond delay="0"/>
+                                  </p:stCondLst>
+                                  <p:childTnLst>
+                                    <p:set>
+                                      <p:cBhvr>
+                                        <p:cTn id="11" dur="1" fill="hold">
+                                          <p:stCondLst>
+                                            <p:cond delay="0"/>
+                                          </p:stCondLst>
+                                        </p:cTn>
+                                        <p:tgtEl>
+                                          <p:spTgt spid="3">
+                                            <p:txEl>
+                                              <p:pRg st="2" end="2"/>
+                                            </p:txEl>
+                                          </p:spTgt>
+                                        </p:tgtEl>
+                                        <p:attrNameLst>
+                                          <p:attrName>style.visibility</p:attrName>
+                                        </p:attrNameLst>
+                                      </p:cBhvr>
+                                      <p:to>
+                                        <p:strVal val="visible"/>
+                                      </p:to>
+                                    </p:set>
+                                    <p:animEffect transition="in" filter="fade">
+                                      <p:cBhvr>
+                                        <p:cTn id="12" dur="500"/>
+                                        <p:tgtEl>
+                                          <p:spTgt spid="3">
+                                            <p:txEl>
+                                              <p:pRg st="2" end="2"/>
+                                            </p:txEl>
+                                          </p:spTgt>
+                                        </p:tgtEl>
+                                      </p:cBhvr>
+                                    </p:animEffect>
+                                  </p:childTnLst>
+                                </p:cTn>
+                              </p:par>
+                            </p:childTnLst>
+                          </p:cTn>
+                        </p:par>
+                        <p:par>
+                          <p:cTn id="13" fill="hold">
+                            <p:stCondLst>
+                              <p:cond delay="500"/>
+                            </p:stCondLst>
+                            <p:childTnLst>
+                              <p:par>
+                                <p:cTn id="14" presetID="10" presetClass="entr" presetSubtype="0" fill="hold" grpId="0" nodeType="afterEffect">
+                                  <p:stCondLst>
+                                    <p:cond delay="0"/>
+                                  </p:stCondLst>
+                                  <p:childTnLst>
+                                    <p:set>
+                                      <p:cBhvr>
+                                        <p:cTn id="15" dur="1" fill="hold">
+                                          <p:stCondLst>
+                                            <p:cond delay="0"/>
+                                          </p:stCondLst>
+                                        </p:cTn>
+                                        <p:tgtEl>
+                                          <p:spTgt spid="3">
+                                            <p:txEl>
+                                              <p:pRg st="3" end="3"/>
+                                            </p:txEl>
+                                          </p:spTgt>
+                                        </p:tgtEl>
+                                        <p:attrNameLst>
+                                          <p:attrName>style.visibility</p:attrName>
+                                        </p:attrNameLst>
+                                      </p:cBhvr>
+                                      <p:to>
+                                        <p:strVal val="visible"/>
+                                      </p:to>
+                                    </p:set>
+                                    <p:animEffect transition="in" filter="fade">
+                                      <p:cBhvr>
+                                        <p:cTn id="16" dur="250"/>
+                                        <p:tgtEl>
+                                          <p:spTgt spid="3">
+                                            <p:txEl>
+                                              <p:pRg st="3" end="3"/>
+                                            </p:txEl>
+                                          </p:spTgt>
+                                        </p:tgtEl>
+                                      </p:cBhvr>
+                                    </p:animEffect>
+                                  </p:childTnLst>
+                                </p:cTn>
+                              </p:par>
+                            </p:childTnLst>
+                          </p:cTn>
+                        </p:par>
+                        <p:par>
+                          <p:cTn id="17" fill="hold">
+                            <p:stCondLst>
+                              <p:cond delay="750"/>
+                            </p:stCondLst>
+                            <p:childTnLst>
+                              <p:par>
+                                <p:cTn id="18" presetID="10" presetClass="entr" presetSubtype="0" fill="hold" grpId="0" nodeType="afterEffect">
+                                  <p:stCondLst>
+                                    <p:cond delay="0"/>
+                                  </p:stCondLst>
+                                  <p:childTnLst>
+                                    <p:set>
+                                      <p:cBhvr>
+                                        <p:cTn id="19" dur="1" fill="hold">
+                                          <p:stCondLst>
+                                            <p:cond delay="0"/>
+                                          </p:stCondLst>
+                                        </p:cTn>
+                                        <p:tgtEl>
+                                          <p:spTgt spid="3">
+                                            <p:txEl>
+                                              <p:pRg st="4" end="4"/>
+                                            </p:txEl>
+                                          </p:spTgt>
+                                        </p:tgtEl>
+                                        <p:attrNameLst>
+                                          <p:attrName>style.visibility</p:attrName>
+                                        </p:attrNameLst>
+                                      </p:cBhvr>
+                                      <p:to>
+                                        <p:strVal val="visible"/>
+                                      </p:to>
+                                    </p:set>
+                                    <p:animEffect transition="in" filter="fade">
+                                      <p:cBhvr>
+                                        <p:cTn id="20" dur="250"/>
+                                        <p:tgtEl>
+                                          <p:spTgt spid="3">
+                                            <p:txEl>
+                                              <p:pRg st="4" end="4"/>
+                                            </p:txEl>
+                                          </p:spTgt>
+                                        </p:tgtEl>
+                                      </p:cBhvr>
+                                    </p:animEffect>
+                                  </p:childTnLst>
+                                </p:cTn>
+                              </p:par>
+                            </p:childTnLst>
+                          </p:cTn>
+                        </p:par>
+                        <p:par>
+                          <p:cTn id="21" fill="hold">
+                            <p:stCondLst>
+                              <p:cond delay="1000"/>
+                            </p:stCondLst>
+                            <p:childTnLst>
+                              <p:par>
+                                <p:cTn id="22" presetID="10" presetClass="entr" presetSubtype="0" fill="hold" grpId="0" nodeType="afterEffect">
+                                  <p:stCondLst>
+                                    <p:cond delay="0"/>
+                                  </p:stCondLst>
+                                  <p:childTnLst>
+                                    <p:set>
+                                      <p:cBhvr>
+                                        <p:cTn id="23" dur="1" fill="hold">
+                                          <p:stCondLst>
+                                            <p:cond delay="0"/>
+                                          </p:stCondLst>
+                                        </p:cTn>
+                                        <p:tgtEl>
+                                          <p:spTgt spid="3">
+                                            <p:txEl>
+                                              <p:pRg st="5" end="5"/>
+                                            </p:txEl>
+                                          </p:spTgt>
+                                        </p:tgtEl>
+                                        <p:attrNameLst>
+                                          <p:attrName>style.visibility</p:attrName>
+                                        </p:attrNameLst>
+                                      </p:cBhvr>
+                                      <p:to>
+                                        <p:strVal val="visible"/>
+                                      </p:to>
+                                    </p:set>
+                                    <p:animEffect transition="in" filter="fade">
+                                      <p:cBhvr>
+                                        <p:cTn id="24" dur="250"/>
+                                        <p:tgtEl>
+                                          <p:spTgt spid="3">
+                                            <p:txEl>
+                                              <p:pRg st="5" end="5"/>
+                                            </p:txEl>
+                                          </p:spTgt>
+                                        </p:tgtEl>
+                                      </p:cBhvr>
+                                    </p:animEffect>
+                                  </p:childTnLst>
+                                </p:cTn>
+                              </p:par>
+                            </p:childTnLst>
+                          </p:cTn>
+                        </p:par>
+                        <p:par>
+                          <p:cTn id="25" fill="hold">
+                            <p:stCondLst>
+                              <p:cond delay="1250"/>
+                            </p:stCondLst>
+                            <p:childTnLst>
+                              <p:par>
+                                <p:cTn id="26" presetID="10" presetClass="entr" presetSubtype="0" fill="hold" grpId="0" nodeType="afterEffect">
+                                  <p:stCondLst>
+                                    <p:cond delay="0"/>
+                                  </p:stCondLst>
+                                  <p:childTnLst>
+                                    <p:set>
+                                      <p:cBhvr>
+                                        <p:cTn id="27" dur="1" fill="hold">
+                                          <p:stCondLst>
+                                            <p:cond delay="0"/>
+                                          </p:stCondLst>
+                                        </p:cTn>
+                                        <p:tgtEl>
+                                          <p:spTgt spid="3">
+                                            <p:txEl>
+                                              <p:pRg st="6" end="6"/>
+                                            </p:txEl>
+                                          </p:spTgt>
+                                        </p:tgtEl>
+                                        <p:attrNameLst>
+                                          <p:attrName>style.visibility</p:attrName>
+                                        </p:attrNameLst>
+                                      </p:cBhvr>
+                                      <p:to>
+                                        <p:strVal val="visible"/>
+                                      </p:to>
+                                    </p:set>
+                                    <p:animEffect transition="in" filter="fade">
+                                      <p:cBhvr>
+                                        <p:cTn id="28" dur="250"/>
+                                        <p:tgtEl>
+                                          <p:spTgt spid="3">
+                                            <p:txEl>
+                                              <p:pRg st="6" end="6"/>
+                                            </p:txEl>
+                                          </p:spTgt>
+                                        </p:tgtEl>
+                                      </p:cBhvr>
+                                    </p:animEffect>
+                                  </p:childTnLst>
+                                </p:cTn>
+                              </p:par>
+                            </p:childTnLst>
+                          </p:cTn>
+                        </p:par>
+                      </p:childTnLst>
+                    </p:cTn>
+                  </p:par>
+                  <p:par>
+                    <p:cTn id="29" fill="hold">
+                      <p:stCondLst>
+                        <p:cond delay="indefinite"/>
+                      </p:stCondLst>
+                      <p:childTnLst>
+                        <p:par>
+                          <p:cTn id="30" fill="hold">
+                            <p:stCondLst>
+                              <p:cond delay="0"/>
+                            </p:stCondLst>
+                            <p:childTnLst>
+                              <p:par>
+                                <p:cTn id="31" presetID="10" presetClass="entr" presetSubtype="0" fill="hold" nodeType="clickEffect">
+                                  <p:stCondLst>
+                                    <p:cond delay="0"/>
+                                  </p:stCondLst>
+                                  <p:childTnLst>
+                                    <p:set>
+                                      <p:cBhvr>
+                                        <p:cTn id="32" dur="1" fill="hold">
+                                          <p:stCondLst>
+                                            <p:cond delay="0"/>
+                                          </p:stCondLst>
+                                        </p:cTn>
+                                        <p:tgtEl>
+                                          <p:spTgt spid="4"/>
+                                        </p:tgtEl>
+                                        <p:attrNameLst>
+                                          <p:attrName>style.visibility</p:attrName>
+                                        </p:attrNameLst>
+                                      </p:cBhvr>
+                                      <p:to>
+                                        <p:strVal val="visible"/>
+                                      </p:to>
+                                    </p:set>
+                                    <p:animEffect transition="in" filter="fade">
+                                      <p:cBhvr>
+                                        <p:cTn id="33" dur="500"/>
+                                        <p:tgtEl>
+                                          <p:spTgt spid="4"/>
+                                        </p:tgtEl>
+                                      </p:cBhvr>
+                                    </p:animEffect>
+                                  </p:childTnLst>
+                                </p:cTn>
+                              </p:par>
+                              <p:par>
+                                <p:cTn id="34" presetID="10" presetClass="entr" presetSubtype="0" fill="hold" nodeType="withEffect">
+                                  <p:stCondLst>
+                                    <p:cond delay="0"/>
+                                  </p:stCondLst>
+                                  <p:childTnLst>
+                                    <p:set>
+                                      <p:cBhvr>
+                                        <p:cTn id="35" dur="1" fill="hold">
+                                          <p:stCondLst>
+                                            <p:cond delay="0"/>
+                                          </p:stCondLst>
+                                        </p:cTn>
+                                        <p:tgtEl>
+                                          <p:spTgt spid="6"/>
+                                        </p:tgtEl>
+                                        <p:attrNameLst>
+                                          <p:attrName>style.visibility</p:attrName>
+                                        </p:attrNameLst>
+                                      </p:cBhvr>
+                                      <p:to>
+                                        <p:strVal val="visible"/>
+                                      </p:to>
+                                    </p:set>
+                                    <p:animEffect transition="in" filter="fade">
+                                      <p:cBhvr>
+                                        <p:cTn id="36" dur="500"/>
+                                        <p:tgtEl>
+                                          <p:spTgt spid="6"/>
+                                        </p:tgtEl>
+                                      </p:cBhvr>
+                                    </p:animEffect>
+                                  </p:childTnLst>
+                                </p:cTn>
+                              </p:par>
+                            </p:childTnLst>
+                          </p:cTn>
+                        </p:par>
+                        <p:par>
+                          <p:cTn id="37" fill="hold">
+                            <p:stCondLst>
+                              <p:cond delay="500"/>
+                            </p:stCondLst>
+                            <p:childTnLst>
+                              <p:par>
+                                <p:cTn id="38" presetID="1" presetClass="mediacall" presetSubtype="0" fill="hold" nodeType="afterEffect">
+                                  <p:stCondLst>
+                                    <p:cond delay="0"/>
+                                  </p:stCondLst>
+                                  <p:childTnLst>
+                                    <p:cmd type="call" cmd="playFrom(0.0)">
+                                      <p:cBhvr>
+                                        <p:cTn id="39" dur="10" fill="hold"/>
+                                        <p:tgtEl>
+                                          <p:spTgt spid="4"/>
+                                        </p:tgtEl>
+                                      </p:cBhvr>
+                                    </p:cmd>
+                                  </p:childTnLst>
+                                </p:cTn>
+                              </p:par>
+                            </p:childTnLst>
+                          </p:cTn>
+                        </p:par>
+                      </p:childTnLst>
+                    </p:cTn>
+                  </p:par>
+                </p:childTnLst>
+              </p:cTn>
+              <p:prevCondLst>
+                <p:cond evt="onPrev" delay="0">
+                  <p:tgtEl>
+                    <p:sldTgt/>
+                  </p:tgtEl>
+                </p:cond>
+              </p:prevCondLst>
+              <p:nextCondLst>
+                <p:cond evt="onNext" delay="0">
+                  <p:tgtEl>
+                    <p:sldTgt/>
+                  </p:tgtEl>
+                </p:cond>
+              </p:nextCondLst>
+            </p:seq>
+            <p:video>
+              <p:cMediaNode vol="80000">
+                <p:cTn id="40" fill="hold" display="0">
+                  <p:stCondLst>
+                    <p:cond delay="indefinite"/>
+                  </p:stCondLst>
+                </p:cTn>
+                <p:tgtEl>
+                  <p:spTgt spid="4"/>
+                </p:tgtEl>
+              </p:cMediaNode>
+            </p:video>
+          </p:childTnLst>
+        </p:cTn>
+      </p:par>
+    </p:tnLst>
+    <p:bldLst>
+      <p:bldP spid="3" grpId="0" uiExpand="1" build="p"/>
+    </p:bldLst>
+  </p:timing>
 </p:sld>
 </file>
 
-<file path=ppt/slides/slide7.xml><?xml version="1.0" encoding="utf-8"?>
+<file path=ppt/slides/slide9.xml><?xml version="1.0" encoding="utf-8"?>
 <p:sld xmlns:a="http://schemas.openxmlformats.org/drawingml/2006/main" xmlns:r="http://schemas.openxmlformats.org/officeDocument/2006/relationships" xmlns:p="http://schemas.openxmlformats.org/presentationml/2006/main">
   <p:cSld>
     <p:spTree>
@@ -5888,48 +7254,6 @@
     <p:extLst>
       <p:ext uri="{BB962C8B-B14F-4D97-AF65-F5344CB8AC3E}">
         <p14:creationId xmlns:p14="http://schemas.microsoft.com/office/powerpoint/2010/main" val="3271636799"/>
-      </p:ext>
-    </p:extLst>
-  </p:cSld>
-  <p:clrMapOvr>
-    <a:masterClrMapping/>
-  </p:clrMapOvr>
-  <mc:AlternateContent xmlns:mc="http://schemas.openxmlformats.org/markup-compatibility/2006">
-    <mc:Choice xmlns:p159="http://schemas.microsoft.com/office/powerpoint/2015/09/main" Requires="p159">
-      <p:transition xmlns:p14="http://schemas.microsoft.com/office/powerpoint/2010/main" spd="slow" p14:dur="2000">
-        <p159:morph option="byObject"/>
-      </p:transition>
-    </mc:Choice>
-    <mc:Fallback>
-      <p:transition spd="slow">
-        <p:fade/>
-      </p:transition>
-    </mc:Fallback>
-  </mc:AlternateContent>
-</p:sld>
-</file>
-
-<file path=ppt/slides/slide8.xml><?xml version="1.0" encoding="utf-8"?>
-<p:sld xmlns:a="http://schemas.openxmlformats.org/drawingml/2006/main" xmlns:r="http://schemas.openxmlformats.org/officeDocument/2006/relationships" xmlns:p="http://schemas.openxmlformats.org/presentationml/2006/main">
-  <p:cSld>
-    <p:spTree>
-      <p:nvGrpSpPr>
-        <p:cNvPr id="1" name=""/>
-        <p:cNvGrpSpPr/>
-        <p:nvPr/>
-      </p:nvGrpSpPr>
-      <p:grpSpPr>
-        <a:xfrm>
-          <a:off x="0" y="0"/>
-          <a:ext cx="0" cy="0"/>
-          <a:chOff x="0" y="0"/>
-          <a:chExt cx="0" cy="0"/>
-        </a:xfrm>
-      </p:grpSpPr>
-    </p:spTree>
-    <p:extLst>
-      <p:ext uri="{BB962C8B-B14F-4D97-AF65-F5344CB8AC3E}">
-        <p14:creationId xmlns:p14="http://schemas.microsoft.com/office/powerpoint/2010/main" val="3769555955"/>
       </p:ext>
     </p:extLst>
   </p:cSld>

</xml_diff>